<commit_message>
Still comparing inference v4 vs V7
</commit_message>
<xml_diff>
--- a/assets/00_fraud_detection_2_soutenance.pptx
+++ b/assets/00_fraud_detection_2_soutenance.pptx
@@ -134,7 +134,7 @@
 <file path=ppt/revisionInfo.xml><?xml version="1.0" encoding="utf-8"?>
 <p1510:revInfo xmlns:a="http://schemas.openxmlformats.org/drawingml/2006/main" xmlns:r="http://schemas.openxmlformats.org/officeDocument/2006/relationships" xmlns:p1510="http://schemas.microsoft.com/office/powerpoint/2015/10/main">
   <p1510:revLst>
-    <p1510:client id="{3C79230B-7AE9-4581-A7F6-ED0B16643BEC}" v="163" dt="2024-11-27T12:15:15.290"/>
+    <p1510:client id="{3C79230B-7AE9-4581-A7F6-ED0B16643BEC}" v="173" dt="2024-11-28T11:42:28.553"/>
   </p1510:revLst>
 </p1510:revInfo>
 </file>
@@ -8338,12 +8338,12 @@
   <pc:docChgLst>
     <pc:chgData name="Philippe Baucour" userId="5102170ae7533958" providerId="LiveId" clId="{3C79230B-7AE9-4581-A7F6-ED0B16643BEC}"/>
     <pc:docChg chg="undo redo custSel addSld delSld modSld sldOrd">
-      <pc:chgData name="Philippe Baucour" userId="5102170ae7533958" providerId="LiveId" clId="{3C79230B-7AE9-4581-A7F6-ED0B16643BEC}" dt="2024-11-27T21:34:41.476" v="515" actId="1038"/>
+      <pc:chgData name="Philippe Baucour" userId="5102170ae7533958" providerId="LiveId" clId="{3C79230B-7AE9-4581-A7F6-ED0B16643BEC}" dt="2024-11-28T12:01:27.173" v="901" actId="20577"/>
       <pc:docMkLst>
         <pc:docMk/>
       </pc:docMkLst>
       <pc:sldChg chg="modSp mod modTransition">
-        <pc:chgData name="Philippe Baucour" userId="5102170ae7533958" providerId="LiveId" clId="{3C79230B-7AE9-4581-A7F6-ED0B16643BEC}" dt="2024-11-27T11:24:24.714" v="85"/>
+        <pc:chgData name="Philippe Baucour" userId="5102170ae7533958" providerId="LiveId" clId="{3C79230B-7AE9-4581-A7F6-ED0B16643BEC}" dt="2024-11-28T11:51:12.185" v="847" actId="1035"/>
         <pc:sldMkLst>
           <pc:docMk/>
           <pc:sldMk cId="1392602265" sldId="256"/>
@@ -8356,9 +8356,49 @@
             <ac:spMk id="3" creationId="{08069205-150B-B4B1-565B-156D78F5E9E8}"/>
           </ac:spMkLst>
         </pc:spChg>
+        <pc:spChg chg="mod">
+          <ac:chgData name="Philippe Baucour" userId="5102170ae7533958" providerId="LiveId" clId="{3C79230B-7AE9-4581-A7F6-ED0B16643BEC}" dt="2024-11-28T11:51:12.185" v="847" actId="1035"/>
+          <ac:spMkLst>
+            <pc:docMk/>
+            <pc:sldMk cId="1392602265" sldId="256"/>
+            <ac:spMk id="9" creationId="{A0CDF9F3-4C89-322A-8854-59C64DD36E6C}"/>
+          </ac:spMkLst>
+        </pc:spChg>
+        <pc:picChg chg="mod">
+          <ac:chgData name="Philippe Baucour" userId="5102170ae7533958" providerId="LiveId" clId="{3C79230B-7AE9-4581-A7F6-ED0B16643BEC}" dt="2024-11-28T11:51:04.294" v="778" actId="1035"/>
+          <ac:picMkLst>
+            <pc:docMk/>
+            <pc:sldMk cId="1392602265" sldId="256"/>
+            <ac:picMk id="4" creationId="{44B1A1B4-D0CD-EA8E-DBA4-56385D79DDA8}"/>
+          </ac:picMkLst>
+        </pc:picChg>
+        <pc:picChg chg="mod">
+          <ac:chgData name="Philippe Baucour" userId="5102170ae7533958" providerId="LiveId" clId="{3C79230B-7AE9-4581-A7F6-ED0B16643BEC}" dt="2024-11-28T11:51:01.022" v="754" actId="1036"/>
+          <ac:picMkLst>
+            <pc:docMk/>
+            <pc:sldMk cId="1392602265" sldId="256"/>
+            <ac:picMk id="5" creationId="{D2F66180-A270-694C-7A84-CB5F721DFF31}"/>
+          </ac:picMkLst>
+        </pc:picChg>
+        <pc:picChg chg="mod">
+          <ac:chgData name="Philippe Baucour" userId="5102170ae7533958" providerId="LiveId" clId="{3C79230B-7AE9-4581-A7F6-ED0B16643BEC}" dt="2024-11-28T11:50:58.504" v="735" actId="1036"/>
+          <ac:picMkLst>
+            <pc:docMk/>
+            <pc:sldMk cId="1392602265" sldId="256"/>
+            <ac:picMk id="7" creationId="{E65DC5B8-20AD-8E73-ECE0-7144F19A2BE3}"/>
+          </ac:picMkLst>
+        </pc:picChg>
+        <pc:picChg chg="mod">
+          <ac:chgData name="Philippe Baucour" userId="5102170ae7533958" providerId="LiveId" clId="{3C79230B-7AE9-4581-A7F6-ED0B16643BEC}" dt="2024-11-28T11:51:08.285" v="813" actId="1036"/>
+          <ac:picMkLst>
+            <pc:docMk/>
+            <pc:sldMk cId="1392602265" sldId="256"/>
+            <ac:picMk id="8" creationId="{ED5FF6AF-92FE-7A8C-FE6B-0B4E12DF7FFA}"/>
+          </ac:picMkLst>
+        </pc:picChg>
       </pc:sldChg>
       <pc:sldChg chg="ord modTransition modAnim">
-        <pc:chgData name="Philippe Baucour" userId="5102170ae7533958" providerId="LiveId" clId="{3C79230B-7AE9-4581-A7F6-ED0B16643BEC}" dt="2024-11-27T12:07:09.493" v="431"/>
+        <pc:chgData name="Philippe Baucour" userId="5102170ae7533958" providerId="LiveId" clId="{3C79230B-7AE9-4581-A7F6-ED0B16643BEC}" dt="2024-11-28T11:42:28.553" v="716"/>
         <pc:sldMkLst>
           <pc:docMk/>
           <pc:sldMk cId="3201622378" sldId="257"/>
@@ -8477,7 +8517,7 @@
         </pc:sldMkLst>
       </pc:sldChg>
       <pc:sldChg chg="delSp modSp mod modTransition modAnim">
-        <pc:chgData name="Philippe Baucour" userId="5102170ae7533958" providerId="LiveId" clId="{3C79230B-7AE9-4581-A7F6-ED0B16643BEC}" dt="2024-11-27T21:29:02.741" v="503" actId="1037"/>
+        <pc:chgData name="Philippe Baucour" userId="5102170ae7533958" providerId="LiveId" clId="{3C79230B-7AE9-4581-A7F6-ED0B16643BEC}" dt="2024-11-28T12:01:27.173" v="901" actId="20577"/>
         <pc:sldMkLst>
           <pc:docMk/>
           <pc:sldMk cId="301730762" sldId="286"/>
@@ -8488,6 +8528,30 @@
             <pc:docMk/>
             <pc:sldMk cId="301730762" sldId="286"/>
             <ac:spMk id="105" creationId="{E627E980-90DE-9A6A-73B9-8F3E841093DC}"/>
+          </ac:spMkLst>
+        </pc:spChg>
+        <pc:spChg chg="mod">
+          <ac:chgData name="Philippe Baucour" userId="5102170ae7533958" providerId="LiveId" clId="{3C79230B-7AE9-4581-A7F6-ED0B16643BEC}" dt="2024-11-28T11:59:53.511" v="867" actId="1035"/>
+          <ac:spMkLst>
+            <pc:docMk/>
+            <pc:sldMk cId="301730762" sldId="286"/>
+            <ac:spMk id="119" creationId="{D3DB8799-F374-F10D-1429-496F27B5F915}"/>
+          </ac:spMkLst>
+        </pc:spChg>
+        <pc:spChg chg="mod">
+          <ac:chgData name="Philippe Baucour" userId="5102170ae7533958" providerId="LiveId" clId="{3C79230B-7AE9-4581-A7F6-ED0B16643BEC}" dt="2024-11-28T12:01:12.608" v="898" actId="1038"/>
+          <ac:spMkLst>
+            <pc:docMk/>
+            <pc:sldMk cId="301730762" sldId="286"/>
+            <ac:spMk id="120" creationId="{25AA81E1-DE22-90C7-CD1D-380AEB63F0F9}"/>
+          </ac:spMkLst>
+        </pc:spChg>
+        <pc:spChg chg="mod">
+          <ac:chgData name="Philippe Baucour" userId="5102170ae7533958" providerId="LiveId" clId="{3C79230B-7AE9-4581-A7F6-ED0B16643BEC}" dt="2024-11-28T12:01:27.173" v="901" actId="20577"/>
+          <ac:spMkLst>
+            <pc:docMk/>
+            <pc:sldMk cId="301730762" sldId="286"/>
+            <ac:spMk id="121" creationId="{78025810-C5E9-917D-C21F-41FF8F443DC7}"/>
           </ac:spMkLst>
         </pc:spChg>
         <pc:grpChg chg="del">
@@ -9102,7 +9166,7 @@
         </pc:picChg>
       </pc:sldChg>
       <pc:sldChg chg="addSp delSp modSp new mod ord modShow chgLayout">
-        <pc:chgData name="Philippe Baucour" userId="5102170ae7533958" providerId="LiveId" clId="{3C79230B-7AE9-4581-A7F6-ED0B16643BEC}" dt="2024-11-27T21:26:45.055" v="500" actId="20577"/>
+        <pc:chgData name="Philippe Baucour" userId="5102170ae7533958" providerId="LiveId" clId="{3C79230B-7AE9-4581-A7F6-ED0B16643BEC}" dt="2024-11-28T11:36:17.788" v="705" actId="1076"/>
         <pc:sldMkLst>
           <pc:docMk/>
           <pc:sldMk cId="745338049" sldId="319"/>
@@ -9123,8 +9187,8 @@
             <ac:spMk id="3" creationId="{BDFB1B1D-B57C-6D3A-1C5B-E10186431B31}"/>
           </ac:spMkLst>
         </pc:spChg>
-        <pc:spChg chg="add mod ord">
-          <ac:chgData name="Philippe Baucour" userId="5102170ae7533958" providerId="LiveId" clId="{3C79230B-7AE9-4581-A7F6-ED0B16643BEC}" dt="2024-11-27T11:45:49.155" v="252" actId="700"/>
+        <pc:spChg chg="add del mod ord">
+          <ac:chgData name="Philippe Baucour" userId="5102170ae7533958" providerId="LiveId" clId="{3C79230B-7AE9-4581-A7F6-ED0B16643BEC}" dt="2024-11-28T11:25:56.822" v="576" actId="478"/>
           <ac:spMkLst>
             <pc:docMk/>
             <pc:sldMk cId="745338049" sldId="319"/>
@@ -9132,16 +9196,56 @@
           </ac:spMkLst>
         </pc:spChg>
         <pc:spChg chg="add mod ord">
-          <ac:chgData name="Philippe Baucour" userId="5102170ae7533958" providerId="LiveId" clId="{3C79230B-7AE9-4581-A7F6-ED0B16643BEC}" dt="2024-11-27T21:26:45.055" v="500" actId="20577"/>
+          <ac:chgData name="Philippe Baucour" userId="5102170ae7533958" providerId="LiveId" clId="{3C79230B-7AE9-4581-A7F6-ED0B16643BEC}" dt="2024-11-28T11:36:10.857" v="704" actId="6549"/>
           <ac:spMkLst>
             <pc:docMk/>
             <pc:sldMk cId="745338049" sldId="319"/>
             <ac:spMk id="5" creationId="{DCE92FDD-E7BF-7922-887F-CE13FFA58A17}"/>
           </ac:spMkLst>
         </pc:spChg>
+        <pc:picChg chg="add mod">
+          <ac:chgData name="Philippe Baucour" userId="5102170ae7533958" providerId="LiveId" clId="{3C79230B-7AE9-4581-A7F6-ED0B16643BEC}" dt="2024-11-28T11:27:23.590" v="607" actId="1076"/>
+          <ac:picMkLst>
+            <pc:docMk/>
+            <pc:sldMk cId="745338049" sldId="319"/>
+            <ac:picMk id="3" creationId="{F2EF1D77-7E09-F0ED-9D05-23B8D0175593}"/>
+          </ac:picMkLst>
+        </pc:picChg>
+        <pc:picChg chg="add mod">
+          <ac:chgData name="Philippe Baucour" userId="5102170ae7533958" providerId="LiveId" clId="{3C79230B-7AE9-4581-A7F6-ED0B16643BEC}" dt="2024-11-28T11:27:25.968" v="608" actId="1076"/>
+          <ac:picMkLst>
+            <pc:docMk/>
+            <pc:sldMk cId="745338049" sldId="319"/>
+            <ac:picMk id="7" creationId="{06AAADE9-77A1-D6A9-8B11-F3C495B7240F}"/>
+          </ac:picMkLst>
+        </pc:picChg>
+        <pc:picChg chg="add mod">
+          <ac:chgData name="Philippe Baucour" userId="5102170ae7533958" providerId="LiveId" clId="{3C79230B-7AE9-4581-A7F6-ED0B16643BEC}" dt="2024-11-28T11:34:59.101" v="700" actId="1076"/>
+          <ac:picMkLst>
+            <pc:docMk/>
+            <pc:sldMk cId="745338049" sldId="319"/>
+            <ac:picMk id="9" creationId="{CDB66534-62A7-193F-698D-7A7E8F402B5D}"/>
+          </ac:picMkLst>
+        </pc:picChg>
+        <pc:picChg chg="add mod">
+          <ac:chgData name="Philippe Baucour" userId="5102170ae7533958" providerId="LiveId" clId="{3C79230B-7AE9-4581-A7F6-ED0B16643BEC}" dt="2024-11-28T11:36:17.788" v="705" actId="1076"/>
+          <ac:picMkLst>
+            <pc:docMk/>
+            <pc:sldMk cId="745338049" sldId="319"/>
+            <ac:picMk id="11" creationId="{90FEF72E-A724-68A4-7B7F-CBB5AC7B0457}"/>
+          </ac:picMkLst>
+        </pc:picChg>
+        <pc:picChg chg="add mod">
+          <ac:chgData name="Philippe Baucour" userId="5102170ae7533958" providerId="LiveId" clId="{3C79230B-7AE9-4581-A7F6-ED0B16643BEC}" dt="2024-11-28T11:36:07.890" v="703" actId="1076"/>
+          <ac:picMkLst>
+            <pc:docMk/>
+            <pc:sldMk cId="745338049" sldId="319"/>
+            <ac:picMk id="13" creationId="{3BF037C2-9A7E-1928-E684-0BACBD07B70D}"/>
+          </ac:picMkLst>
+        </pc:picChg>
       </pc:sldChg>
       <pc:sldChg chg="addSp modSp new mod modAnim">
-        <pc:chgData name="Philippe Baucour" userId="5102170ae7533958" providerId="LiveId" clId="{3C79230B-7AE9-4581-A7F6-ED0B16643BEC}" dt="2024-11-27T12:14:27.405" v="481"/>
+        <pc:chgData name="Philippe Baucour" userId="5102170ae7533958" providerId="LiveId" clId="{3C79230B-7AE9-4581-A7F6-ED0B16643BEC}" dt="2024-11-28T11:41:35.063" v="715" actId="167"/>
         <pc:sldMkLst>
           <pc:docMk/>
           <pc:sldMk cId="592055540" sldId="320"/>
@@ -9187,7 +9291,7 @@
           </ac:picMkLst>
         </pc:picChg>
         <pc:picChg chg="add mod ord">
-          <ac:chgData name="Philippe Baucour" userId="5102170ae7533958" providerId="LiveId" clId="{3C79230B-7AE9-4581-A7F6-ED0B16643BEC}" dt="2024-11-27T12:13:23.007" v="471" actId="1076"/>
+          <ac:chgData name="Philippe Baucour" userId="5102170ae7533958" providerId="LiveId" clId="{3C79230B-7AE9-4581-A7F6-ED0B16643BEC}" dt="2024-11-28T08:58:05.767" v="519" actId="1076"/>
           <ac:picMkLst>
             <pc:docMk/>
             <pc:sldMk cId="592055540" sldId="320"/>
@@ -9216,6 +9320,14 @@
             <pc:docMk/>
             <pc:sldMk cId="592055540" sldId="320"/>
             <ac:picMk id="10" creationId="{A2E16496-9C1B-FF28-9DB3-FCDD761844BF}"/>
+          </ac:picMkLst>
+        </pc:picChg>
+        <pc:picChg chg="add mod ord">
+          <ac:chgData name="Philippe Baucour" userId="5102170ae7533958" providerId="LiveId" clId="{3C79230B-7AE9-4581-A7F6-ED0B16643BEC}" dt="2024-11-28T11:41:35.063" v="715" actId="167"/>
+          <ac:picMkLst>
+            <pc:docMk/>
+            <pc:sldMk cId="592055540" sldId="320"/>
+            <ac:picMk id="12" creationId="{2191F210-FD8F-C79F-51E0-7AA6D087E735}"/>
           </ac:picMkLst>
         </pc:picChg>
       </pc:sldChg>
@@ -11219,7 +11331,7 @@
           <a:p>
             <a:fld id="{FD1752CD-A7D2-4825-BC26-9DAEFBD0A5FF}" type="datetimeFigureOut">
               <a:rPr lang="fr-FR" smtClean="0"/>
-              <a:t>27/11/2024</a:t>
+              <a:t>28/11/2024</a:t>
             </a:fld>
             <a:endParaRPr lang="fr-FR"/>
           </a:p>
@@ -12110,7 +12222,7 @@
           <a:p>
             <a:fld id="{7ECB9D5A-E5E4-41FE-AF39-634902D6D5D2}" type="datetimeFigureOut">
               <a:rPr lang="fr-FR" smtClean="0"/>
-              <a:t>27/11/2024</a:t>
+              <a:t>28/11/2024</a:t>
             </a:fld>
             <a:endParaRPr lang="fr-FR"/>
           </a:p>
@@ -12308,7 +12420,7 @@
           <a:p>
             <a:fld id="{7ECB9D5A-E5E4-41FE-AF39-634902D6D5D2}" type="datetimeFigureOut">
               <a:rPr lang="fr-FR" smtClean="0"/>
-              <a:t>27/11/2024</a:t>
+              <a:t>28/11/2024</a:t>
             </a:fld>
             <a:endParaRPr lang="fr-FR"/>
           </a:p>
@@ -12516,7 +12628,7 @@
           <a:p>
             <a:fld id="{7ECB9D5A-E5E4-41FE-AF39-634902D6D5D2}" type="datetimeFigureOut">
               <a:rPr lang="fr-FR" smtClean="0"/>
-              <a:t>27/11/2024</a:t>
+              <a:t>28/11/2024</a:t>
             </a:fld>
             <a:endParaRPr lang="fr-FR"/>
           </a:p>
@@ -12714,7 +12826,7 @@
           <a:p>
             <a:fld id="{7ECB9D5A-E5E4-41FE-AF39-634902D6D5D2}" type="datetimeFigureOut">
               <a:rPr lang="fr-FR" smtClean="0"/>
-              <a:t>27/11/2024</a:t>
+              <a:t>28/11/2024</a:t>
             </a:fld>
             <a:endParaRPr lang="fr-FR"/>
           </a:p>
@@ -12989,7 +13101,7 @@
           <a:p>
             <a:fld id="{7ECB9D5A-E5E4-41FE-AF39-634902D6D5D2}" type="datetimeFigureOut">
               <a:rPr lang="fr-FR" smtClean="0"/>
-              <a:t>27/11/2024</a:t>
+              <a:t>28/11/2024</a:t>
             </a:fld>
             <a:endParaRPr lang="fr-FR"/>
           </a:p>
@@ -13254,7 +13366,7 @@
           <a:p>
             <a:fld id="{7ECB9D5A-E5E4-41FE-AF39-634902D6D5D2}" type="datetimeFigureOut">
               <a:rPr lang="fr-FR" smtClean="0"/>
-              <a:t>27/11/2024</a:t>
+              <a:t>28/11/2024</a:t>
             </a:fld>
             <a:endParaRPr lang="fr-FR"/>
           </a:p>
@@ -13666,7 +13778,7 @@
           <a:p>
             <a:fld id="{7ECB9D5A-E5E4-41FE-AF39-634902D6D5D2}" type="datetimeFigureOut">
               <a:rPr lang="fr-FR" smtClean="0"/>
-              <a:t>27/11/2024</a:t>
+              <a:t>28/11/2024</a:t>
             </a:fld>
             <a:endParaRPr lang="fr-FR"/>
           </a:p>
@@ -13807,7 +13919,7 @@
           <a:p>
             <a:fld id="{7ECB9D5A-E5E4-41FE-AF39-634902D6D5D2}" type="datetimeFigureOut">
               <a:rPr lang="fr-FR" smtClean="0"/>
-              <a:t>27/11/2024</a:t>
+              <a:t>28/11/2024</a:t>
             </a:fld>
             <a:endParaRPr lang="fr-FR"/>
           </a:p>
@@ -13920,7 +14032,7 @@
           <a:p>
             <a:fld id="{7ECB9D5A-E5E4-41FE-AF39-634902D6D5D2}" type="datetimeFigureOut">
               <a:rPr lang="fr-FR" smtClean="0"/>
-              <a:t>27/11/2024</a:t>
+              <a:t>28/11/2024</a:t>
             </a:fld>
             <a:endParaRPr lang="fr-FR"/>
           </a:p>
@@ -14231,7 +14343,7 @@
           <a:p>
             <a:fld id="{7ECB9D5A-E5E4-41FE-AF39-634902D6D5D2}" type="datetimeFigureOut">
               <a:rPr lang="fr-FR" smtClean="0"/>
-              <a:t>27/11/2024</a:t>
+              <a:t>28/11/2024</a:t>
             </a:fld>
             <a:endParaRPr lang="fr-FR"/>
           </a:p>
@@ -14522,7 +14634,7 @@
           <a:p>
             <a:fld id="{7ECB9D5A-E5E4-41FE-AF39-634902D6D5D2}" type="datetimeFigureOut">
               <a:rPr lang="fr-FR" smtClean="0"/>
-              <a:t>27/11/2024</a:t>
+              <a:t>28/11/2024</a:t>
             </a:fld>
             <a:endParaRPr lang="fr-FR"/>
           </a:p>
@@ -14763,7 +14875,7 @@
           <a:p>
             <a:fld id="{7ECB9D5A-E5E4-41FE-AF39-634902D6D5D2}" type="datetimeFigureOut">
               <a:rPr lang="fr-FR" smtClean="0"/>
-              <a:t>27/11/2024</a:t>
+              <a:t>28/11/2024</a:t>
             </a:fld>
             <a:endParaRPr lang="fr-FR"/>
           </a:p>
@@ -15182,31 +15294,6 @@
       </p:grpSpPr>
       <p:sp>
         <p:nvSpPr>
-          <p:cNvPr id="4" name="Titre 3">
-            <a:extLst>
-              <a:ext uri="{FF2B5EF4-FFF2-40B4-BE49-F238E27FC236}">
-                <a16:creationId xmlns:a16="http://schemas.microsoft.com/office/drawing/2014/main" id="{8195C713-881A-194E-26A9-3CC20EDDB718}"/>
-              </a:ext>
-            </a:extLst>
-          </p:cNvPr>
-          <p:cNvSpPr>
-            <a:spLocks noGrp="1"/>
-          </p:cNvSpPr>
-          <p:nvPr>
-            <p:ph type="title"/>
-          </p:nvPr>
-        </p:nvSpPr>
-        <p:spPr/>
-        <p:txBody>
-          <a:bodyPr/>
-          <a:lstStyle/>
-          <a:p>
-            <a:endParaRPr lang="fr-FR"/>
-          </a:p>
-        </p:txBody>
-      </p:sp>
-      <p:sp>
-        <p:nvSpPr>
           <p:cNvPr id="5" name="Espace réservé du contenu 4">
             <a:extLst>
               <a:ext uri="{FF2B5EF4-FFF2-40B4-BE49-F238E27FC236}">
@@ -15221,30 +15308,25 @@
             <p:ph idx="1"/>
           </p:nvPr>
         </p:nvSpPr>
-        <p:spPr/>
+        <p:spPr>
+          <a:xfrm>
+            <a:off x="213360" y="0"/>
+            <a:ext cx="11765280" cy="6858000"/>
+          </a:xfrm>
+        </p:spPr>
         <p:txBody>
           <a:bodyPr/>
           <a:lstStyle/>
           <a:p>
             <a:r>
-              <a:rPr lang="fr-FR" dirty="0" err="1"/>
-              <a:t>Ouvri</a:t>
-            </a:r>
-            <a:r>
               <a:rPr lang="fr-FR" dirty="0"/>
-              <a:t> VSCode</a:t>
-            </a:r>
-          </a:p>
-          <a:p>
-            <a:r>
-              <a:rPr lang="fr-FR" dirty="0"/>
-              <a:t>Ouvrir GitHub : </a:t>
+              <a:t>GitHub : </a:t>
             </a:r>
           </a:p>
           <a:p>
             <a:pPr lvl="1"/>
             <a:r>
-              <a:rPr lang="fr-FR" dirty="0">
+              <a:rPr lang="fr-FR" sz="1800" dirty="0">
                 <a:hlinkClick r:id="rId2"/>
               </a:rPr>
               <a:t>GitHub - 40tude/fraud_detection_2</a:t>
@@ -15254,13 +15336,13 @@
           <a:p>
             <a:r>
               <a:rPr lang="fr-FR" dirty="0"/>
-              <a:t>Ouvrir YouTube : </a:t>
+              <a:t>YouTube : </a:t>
             </a:r>
           </a:p>
           <a:p>
             <a:pPr lvl="1"/>
             <a:r>
-              <a:rPr lang="fr-FR" dirty="0">
+              <a:rPr lang="fr-FR" sz="1800" dirty="0">
                 <a:hlinkClick r:id="rId3"/>
               </a:rPr>
               <a:t>fraud_detection_2 1/2</a:t>
@@ -15270,15 +15352,277 @@
           <a:p>
             <a:pPr lvl="1"/>
             <a:r>
-              <a:rPr lang="fr-FR" dirty="0">
+              <a:rPr lang="fr-FR" sz="1800" dirty="0">
                 <a:hlinkClick r:id="rId4"/>
               </a:rPr>
               <a:t>fraud_detection_2 2/2</a:t>
             </a:r>
             <a:endParaRPr lang="fr-FR" dirty="0"/>
           </a:p>
+          <a:p>
+            <a:r>
+              <a:rPr lang="fr-FR" dirty="0" err="1"/>
+              <a:t>Mlflow</a:t>
+            </a:r>
+            <a:r>
+              <a:rPr lang="fr-FR" dirty="0"/>
+              <a:t> </a:t>
+            </a:r>
+            <a:r>
+              <a:rPr lang="fr-FR" dirty="0" err="1"/>
+              <a:t>Tracking</a:t>
+            </a:r>
+            <a:r>
+              <a:rPr lang="fr-FR" dirty="0"/>
+              <a:t> Server :</a:t>
+            </a:r>
+          </a:p>
+          <a:p>
+            <a:pPr lvl="1"/>
+            <a:r>
+              <a:rPr lang="fr-FR" sz="1800" dirty="0">
+                <a:hlinkClick r:id="rId5"/>
+              </a:rPr>
+              <a:t>https://fraud-detection-2-ab95815c7127.herokuapp.com/</a:t>
+            </a:r>
+            <a:endParaRPr lang="fr-FR" sz="1800" dirty="0"/>
+          </a:p>
+          <a:p>
+            <a:r>
+              <a:rPr lang="fr-FR" dirty="0"/>
+              <a:t>Drift Server</a:t>
+            </a:r>
+            <a:endParaRPr lang="fr-FR" sz="2200" dirty="0"/>
+          </a:p>
+          <a:p>
+            <a:pPr lvl="1"/>
+            <a:r>
+              <a:rPr lang="fr-FR" sz="1800" dirty="0">
+                <a:hlinkClick r:id="rId6"/>
+              </a:rPr>
+              <a:t>https://fd2-drift-server-485e8a3514d2.herokuapp.com/</a:t>
+            </a:r>
+            <a:endParaRPr lang="fr-FR" sz="1800" dirty="0"/>
+          </a:p>
+          <a:p>
+            <a:endParaRPr lang="fr-FR" dirty="0"/>
+          </a:p>
+          <a:p>
+            <a:r>
+              <a:rPr lang="fr-FR" dirty="0"/>
+              <a:t>AWS</a:t>
+            </a:r>
+            <a:endParaRPr lang="fr-FR" sz="2200" dirty="0"/>
+          </a:p>
+          <a:p>
+            <a:pPr lvl="1"/>
+            <a:r>
+              <a:rPr lang="fr-FR" sz="1800" dirty="0">
+                <a:hlinkClick r:id="rId7"/>
+              </a:rPr>
+              <a:t>https://eu-west-3.console.aws.amazon.com/console/home?region=eu-west-3</a:t>
+            </a:r>
+            <a:endParaRPr lang="fr-FR" sz="1800" dirty="0"/>
+          </a:p>
+          <a:p>
+            <a:pPr lvl="1"/>
+            <a:endParaRPr lang="fr-FR" sz="1800" dirty="0"/>
+          </a:p>
+          <a:p>
+            <a:pPr lvl="1"/>
+            <a:endParaRPr lang="fr-FR" dirty="0"/>
+          </a:p>
+          <a:p>
+            <a:pPr lvl="1"/>
+            <a:endParaRPr lang="fr-FR" dirty="0"/>
+          </a:p>
         </p:txBody>
       </p:sp>
+      <p:pic>
+        <p:nvPicPr>
+          <p:cNvPr id="3" name="Image 2">
+            <a:extLst>
+              <a:ext uri="{FF2B5EF4-FFF2-40B4-BE49-F238E27FC236}">
+                <a16:creationId xmlns:a16="http://schemas.microsoft.com/office/drawing/2014/main" id="{F2EF1D77-7E09-F0ED-9D05-23B8D0175593}"/>
+              </a:ext>
+            </a:extLst>
+          </p:cNvPr>
+          <p:cNvPicPr>
+            <a:picLocks noChangeAspect="1"/>
+          </p:cNvPicPr>
+          <p:nvPr/>
+        </p:nvPicPr>
+        <p:blipFill>
+          <a:blip r:embed="rId8"/>
+          <a:stretch>
+            <a:fillRect/>
+          </a:stretch>
+        </p:blipFill>
+        <p:spPr>
+          <a:xfrm>
+            <a:off x="4273289" y="900545"/>
+            <a:ext cx="1728906" cy="1094509"/>
+          </a:xfrm>
+          <a:prstGeom prst="rect">
+            <a:avLst/>
+          </a:prstGeom>
+          <a:effectLst>
+            <a:outerShdw blurRad="50800" dist="38100" dir="2700000" algn="tl" rotWithShape="0">
+              <a:prstClr val="black">
+                <a:alpha val="40000"/>
+              </a:prstClr>
+            </a:outerShdw>
+          </a:effectLst>
+        </p:spPr>
+      </p:pic>
+      <p:pic>
+        <p:nvPicPr>
+          <p:cNvPr id="7" name="Image 6">
+            <a:extLst>
+              <a:ext uri="{FF2B5EF4-FFF2-40B4-BE49-F238E27FC236}">
+                <a16:creationId xmlns:a16="http://schemas.microsoft.com/office/drawing/2014/main" id="{06AAADE9-77A1-D6A9-8B11-F3C495B7240F}"/>
+              </a:ext>
+            </a:extLst>
+          </p:cNvPr>
+          <p:cNvPicPr>
+            <a:picLocks noChangeAspect="1"/>
+          </p:cNvPicPr>
+          <p:nvPr/>
+        </p:nvPicPr>
+        <p:blipFill>
+          <a:blip r:embed="rId9"/>
+          <a:stretch>
+            <a:fillRect/>
+          </a:stretch>
+        </p:blipFill>
+        <p:spPr>
+          <a:xfrm>
+            <a:off x="6484029" y="160895"/>
+            <a:ext cx="2030922" cy="1092941"/>
+          </a:xfrm>
+          <a:prstGeom prst="rect">
+            <a:avLst/>
+          </a:prstGeom>
+          <a:effectLst>
+            <a:outerShdw blurRad="50800" dist="38100" dir="2700000" algn="tl" rotWithShape="0">
+              <a:prstClr val="black">
+                <a:alpha val="40000"/>
+              </a:prstClr>
+            </a:outerShdw>
+          </a:effectLst>
+        </p:spPr>
+      </p:pic>
+      <p:pic>
+        <p:nvPicPr>
+          <p:cNvPr id="9" name="Image 8">
+            <a:extLst>
+              <a:ext uri="{FF2B5EF4-FFF2-40B4-BE49-F238E27FC236}">
+                <a16:creationId xmlns:a16="http://schemas.microsoft.com/office/drawing/2014/main" id="{CDB66534-62A7-193F-698D-7A7E8F402B5D}"/>
+              </a:ext>
+            </a:extLst>
+          </p:cNvPr>
+          <p:cNvPicPr>
+            <a:picLocks noChangeAspect="1"/>
+          </p:cNvPicPr>
+          <p:nvPr/>
+        </p:nvPicPr>
+        <p:blipFill>
+          <a:blip r:embed="rId10"/>
+          <a:stretch>
+            <a:fillRect/>
+          </a:stretch>
+        </p:blipFill>
+        <p:spPr>
+          <a:xfrm>
+            <a:off x="8797738" y="1156560"/>
+            <a:ext cx="2030922" cy="1558444"/>
+          </a:xfrm>
+          <a:prstGeom prst="rect">
+            <a:avLst/>
+          </a:prstGeom>
+          <a:effectLst>
+            <a:outerShdw blurRad="50800" dist="38100" dir="2700000" algn="tl" rotWithShape="0">
+              <a:prstClr val="black">
+                <a:alpha val="40000"/>
+              </a:prstClr>
+            </a:outerShdw>
+          </a:effectLst>
+        </p:spPr>
+      </p:pic>
+      <p:pic>
+        <p:nvPicPr>
+          <p:cNvPr id="11" name="Image 10">
+            <a:extLst>
+              <a:ext uri="{FF2B5EF4-FFF2-40B4-BE49-F238E27FC236}">
+                <a16:creationId xmlns:a16="http://schemas.microsoft.com/office/drawing/2014/main" id="{90FEF72E-A724-68A4-7B7F-CBB5AC7B0457}"/>
+              </a:ext>
+            </a:extLst>
+          </p:cNvPr>
+          <p:cNvPicPr>
+            <a:picLocks noChangeAspect="1"/>
+          </p:cNvPicPr>
+          <p:nvPr/>
+        </p:nvPicPr>
+        <p:blipFill>
+          <a:blip r:embed="rId11"/>
+          <a:stretch>
+            <a:fillRect/>
+          </a:stretch>
+        </p:blipFill>
+        <p:spPr>
+          <a:xfrm>
+            <a:off x="9947717" y="4906494"/>
+            <a:ext cx="2030923" cy="1120044"/>
+          </a:xfrm>
+          <a:prstGeom prst="rect">
+            <a:avLst/>
+          </a:prstGeom>
+          <a:effectLst>
+            <a:outerShdw blurRad="50800" dist="38100" dir="2700000" algn="tl" rotWithShape="0">
+              <a:prstClr val="black">
+                <a:alpha val="40000"/>
+              </a:prstClr>
+            </a:outerShdw>
+          </a:effectLst>
+        </p:spPr>
+      </p:pic>
+      <p:pic>
+        <p:nvPicPr>
+          <p:cNvPr id="13" name="Image 12">
+            <a:extLst>
+              <a:ext uri="{FF2B5EF4-FFF2-40B4-BE49-F238E27FC236}">
+                <a16:creationId xmlns:a16="http://schemas.microsoft.com/office/drawing/2014/main" id="{3BF037C2-9A7E-1928-E684-0BACBD07B70D}"/>
+              </a:ext>
+            </a:extLst>
+          </p:cNvPr>
+          <p:cNvPicPr>
+            <a:picLocks noChangeAspect="1"/>
+          </p:cNvPicPr>
+          <p:nvPr/>
+        </p:nvPicPr>
+        <p:blipFill>
+          <a:blip r:embed="rId12"/>
+          <a:stretch>
+            <a:fillRect/>
+          </a:stretch>
+        </p:blipFill>
+        <p:spPr>
+          <a:xfrm>
+            <a:off x="8298370" y="2888864"/>
+            <a:ext cx="2038455" cy="1552708"/>
+          </a:xfrm>
+          <a:prstGeom prst="rect">
+            <a:avLst/>
+          </a:prstGeom>
+          <a:effectLst>
+            <a:outerShdw blurRad="50800" dist="38100" dir="2700000" algn="tl" rotWithShape="0">
+              <a:prstClr val="black">
+                <a:alpha val="40000"/>
+              </a:prstClr>
+            </a:outerShdw>
+          </a:effectLst>
+        </p:spPr>
+      </p:pic>
     </p:spTree>
     <p:extLst>
       <p:ext uri="{BB962C8B-B14F-4D97-AF65-F5344CB8AC3E}">
@@ -25380,14 +25724,14 @@
         </p:nvSpPr>
         <p:spPr>
           <a:xfrm>
-            <a:off x="4332775" y="1023502"/>
+            <a:off x="4332775" y="1229979"/>
             <a:ext cx="800219" cy="553998"/>
           </a:xfrm>
           <a:prstGeom prst="rect">
             <a:avLst/>
           </a:prstGeom>
           <a:solidFill>
-            <a:srgbClr val="FDA145"/>
+            <a:srgbClr val="01A687"/>
           </a:solidFill>
           <a:effectLst>
             <a:outerShdw blurRad="50800" dist="38100" dir="2700000" algn="tl" rotWithShape="0">
@@ -25451,8 +25795,8 @@
         </p:nvSpPr>
         <p:spPr>
           <a:xfrm>
-            <a:off x="10444480" y="5527630"/>
-            <a:ext cx="954107" cy="246221"/>
+            <a:off x="10445448" y="5527630"/>
+            <a:ext cx="1107996" cy="246221"/>
           </a:xfrm>
           <a:prstGeom prst="rect">
             <a:avLst/>
@@ -25487,9 +25831,10 @@
             </a:lvl1pPr>
           </a:lstStyle>
           <a:p>
+            <a:pPr algn="l"/>
             <a:r>
               <a:rPr lang="fr-FR" dirty="0"/>
-              <a:t>PostgreSQL</a:t>
+              <a:t>PostgreSQL 1</a:t>
             </a:r>
           </a:p>
         </p:txBody>
@@ -25509,9 +25854,9 @@
         <p:grpSpPr>
           <a:xfrm>
             <a:off x="6014562" y="1027612"/>
-            <a:ext cx="1738253" cy="914400"/>
+            <a:ext cx="1892142" cy="914400"/>
             <a:chOff x="6014562" y="1027612"/>
-            <a:chExt cx="1738253" cy="914400"/>
+            <a:chExt cx="1892142" cy="914400"/>
           </a:xfrm>
         </p:grpSpPr>
         <p:pic>
@@ -25564,8 +25909,8 @@
           </p:nvSpPr>
           <p:spPr>
             <a:xfrm>
-              <a:off x="6798708" y="1341074"/>
-              <a:ext cx="954107" cy="246221"/>
+              <a:off x="6798708" y="1495930"/>
+              <a:ext cx="1107996" cy="246221"/>
             </a:xfrm>
             <a:prstGeom prst="rect">
               <a:avLst/>
@@ -25603,7 +25948,7 @@
               <a:pPr algn="l"/>
               <a:r>
                 <a:rPr lang="fr-FR" dirty="0"/>
-                <a:t>PostgreSQL</a:t>
+                <a:t>PostgreSQL 2</a:t>
               </a:r>
             </a:p>
           </p:txBody>
@@ -29233,10 +29578,10 @@
       </p:grpSpPr>
       <p:pic>
         <p:nvPicPr>
-          <p:cNvPr id="2" name="Image 1">
-            <a:extLst>
-              <a:ext uri="{FF2B5EF4-FFF2-40B4-BE49-F238E27FC236}">
-                <a16:creationId xmlns:a16="http://schemas.microsoft.com/office/drawing/2014/main" id="{4234009D-98D9-2710-5A75-1D5002ECB36C}"/>
+          <p:cNvPr id="12" name="Image 11">
+            <a:extLst>
+              <a:ext uri="{FF2B5EF4-FFF2-40B4-BE49-F238E27FC236}">
+                <a16:creationId xmlns:a16="http://schemas.microsoft.com/office/drawing/2014/main" id="{2191F210-FD8F-C79F-51E0-7AA6D087E735}"/>
               </a:ext>
             </a:extLst>
           </p:cNvPr>
@@ -29247,6 +29592,43 @@
         </p:nvPicPr>
         <p:blipFill>
           <a:blip r:embed="rId2"/>
+          <a:stretch>
+            <a:fillRect/>
+          </a:stretch>
+        </p:blipFill>
+        <p:spPr>
+          <a:xfrm>
+            <a:off x="2935373" y="1777090"/>
+            <a:ext cx="5959673" cy="3731700"/>
+          </a:xfrm>
+          <a:prstGeom prst="rect">
+            <a:avLst/>
+          </a:prstGeom>
+          <a:effectLst>
+            <a:outerShdw blurRad="50800" dist="38100" dir="2700000" algn="tl" rotWithShape="0">
+              <a:prstClr val="black">
+                <a:alpha val="40000"/>
+              </a:prstClr>
+            </a:outerShdw>
+          </a:effectLst>
+        </p:spPr>
+      </p:pic>
+      <p:pic>
+        <p:nvPicPr>
+          <p:cNvPr id="2" name="Image 1">
+            <a:extLst>
+              <a:ext uri="{FF2B5EF4-FFF2-40B4-BE49-F238E27FC236}">
+                <a16:creationId xmlns:a16="http://schemas.microsoft.com/office/drawing/2014/main" id="{4234009D-98D9-2710-5A75-1D5002ECB36C}"/>
+              </a:ext>
+            </a:extLst>
+          </p:cNvPr>
+          <p:cNvPicPr>
+            <a:picLocks noChangeAspect="1"/>
+          </p:cNvPicPr>
+          <p:nvPr/>
+        </p:nvPicPr>
+        <p:blipFill>
+          <a:blip r:embed="rId3"/>
           <a:stretch>
             <a:fillRect/>
           </a:stretch>
@@ -29283,7 +29665,7 @@
           <p:nvPr/>
         </p:nvPicPr>
         <p:blipFill>
-          <a:blip r:embed="rId3"/>
+          <a:blip r:embed="rId4"/>
           <a:stretch>
             <a:fillRect/>
           </a:stretch>
@@ -29320,7 +29702,7 @@
           <p:nvPr/>
         </p:nvPicPr>
         <p:blipFill>
-          <a:blip r:embed="rId4"/>
+          <a:blip r:embed="rId5"/>
           <a:stretch>
             <a:fillRect/>
           </a:stretch>
@@ -29357,7 +29739,7 @@
           <p:nvPr/>
         </p:nvPicPr>
         <p:blipFill>
-          <a:blip r:embed="rId5"/>
+          <a:blip r:embed="rId6"/>
           <a:stretch>
             <a:fillRect/>
           </a:stretch>
@@ -29394,7 +29776,7 @@
           <p:nvPr/>
         </p:nvPicPr>
         <p:blipFill>
-          <a:blip r:embed="rId6"/>
+          <a:blip r:embed="rId7"/>
           <a:stretch>
             <a:fillRect/>
           </a:stretch>
@@ -29431,7 +29813,7 @@
           <p:nvPr/>
         </p:nvPicPr>
         <p:blipFill>
-          <a:blip r:embed="rId7"/>
+          <a:blip r:embed="rId8"/>
           <a:stretch>
             <a:fillRect/>
           </a:stretch>
@@ -29440,43 +29822,6 @@
           <a:xfrm>
             <a:off x="2863036" y="3235367"/>
             <a:ext cx="5821680" cy="1551487"/>
-          </a:xfrm>
-          <a:prstGeom prst="rect">
-            <a:avLst/>
-          </a:prstGeom>
-          <a:effectLst>
-            <a:outerShdw blurRad="50800" dist="38100" dir="2700000" algn="tl" rotWithShape="0">
-              <a:prstClr val="black">
-                <a:alpha val="40000"/>
-              </a:prstClr>
-            </a:outerShdw>
-          </a:effectLst>
-        </p:spPr>
-      </p:pic>
-      <p:pic>
-        <p:nvPicPr>
-          <p:cNvPr id="7" name="Image 6">
-            <a:extLst>
-              <a:ext uri="{FF2B5EF4-FFF2-40B4-BE49-F238E27FC236}">
-                <a16:creationId xmlns:a16="http://schemas.microsoft.com/office/drawing/2014/main" id="{6297DC88-4D3A-B873-E492-D138B4B62C01}"/>
-              </a:ext>
-            </a:extLst>
-          </p:cNvPr>
-          <p:cNvPicPr>
-            <a:picLocks noChangeAspect="1"/>
-          </p:cNvPicPr>
-          <p:nvPr/>
-        </p:nvPicPr>
-        <p:blipFill>
-          <a:blip r:embed="rId8"/>
-          <a:stretch>
-            <a:fillRect/>
-          </a:stretch>
-        </p:blipFill>
-        <p:spPr>
-          <a:xfrm>
-            <a:off x="3646571" y="811882"/>
-            <a:ext cx="5836444" cy="5165589"/>
           </a:xfrm>
           <a:prstGeom prst="rect">
             <a:avLst/>
@@ -29544,6 +29889,43 @@
           <a:xfrm>
             <a:off x="4783652" y="133015"/>
             <a:ext cx="7125660" cy="5176762"/>
+          </a:xfrm>
+          <a:prstGeom prst="rect">
+            <a:avLst/>
+          </a:prstGeom>
+          <a:effectLst>
+            <a:outerShdw blurRad="50800" dist="38100" dir="2700000" algn="tl" rotWithShape="0">
+              <a:prstClr val="black">
+                <a:alpha val="40000"/>
+              </a:prstClr>
+            </a:outerShdw>
+          </a:effectLst>
+        </p:spPr>
+      </p:pic>
+      <p:pic>
+        <p:nvPicPr>
+          <p:cNvPr id="7" name="Image 6">
+            <a:extLst>
+              <a:ext uri="{FF2B5EF4-FFF2-40B4-BE49-F238E27FC236}">
+                <a16:creationId xmlns:a16="http://schemas.microsoft.com/office/drawing/2014/main" id="{6297DC88-4D3A-B873-E492-D138B4B62C01}"/>
+              </a:ext>
+            </a:extLst>
+          </p:cNvPr>
+          <p:cNvPicPr>
+            <a:picLocks noChangeAspect="1"/>
+          </p:cNvPicPr>
+          <p:nvPr/>
+        </p:nvPicPr>
+        <p:blipFill>
+          <a:blip r:embed="rId11"/>
+          <a:stretch>
+            <a:fillRect/>
+          </a:stretch>
+        </p:blipFill>
+        <p:spPr>
+          <a:xfrm>
+            <a:off x="1730088" y="935845"/>
+            <a:ext cx="5836444" cy="5165589"/>
           </a:xfrm>
           <a:prstGeom prst="rect">
             <a:avLst/>
@@ -29593,12 +29975,48 @@
                               <p:par>
                                 <p:cTn id="5" presetID="1" presetClass="entr" presetSubtype="0" fill="hold" nodeType="afterEffect">
                                   <p:stCondLst>
+                                    <p:cond delay="0"/>
+                                  </p:stCondLst>
+                                  <p:childTnLst>
+                                    <p:set>
+                                      <p:cBhvr>
+                                        <p:cTn id="6" dur="1" fill="hold">
+                                          <p:stCondLst>
+                                            <p:cond delay="0"/>
+                                          </p:stCondLst>
+                                        </p:cTn>
+                                        <p:tgtEl>
+                                          <p:spTgt spid="12"/>
+                                        </p:tgtEl>
+                                        <p:attrNameLst>
+                                          <p:attrName>style.visibility</p:attrName>
+                                        </p:attrNameLst>
+                                      </p:cBhvr>
+                                      <p:to>
+                                        <p:strVal val="visible"/>
+                                      </p:to>
+                                    </p:set>
+                                  </p:childTnLst>
+                                </p:cTn>
+                              </p:par>
+                            </p:childTnLst>
+                          </p:cTn>
+                        </p:par>
+                        <p:par>
+                          <p:cTn id="7" fill="hold">
+                            <p:stCondLst>
+                              <p:cond delay="0"/>
+                            </p:stCondLst>
+                            <p:childTnLst>
+                              <p:par>
+                                <p:cTn id="8" presetID="1" presetClass="entr" presetSubtype="0" fill="hold" nodeType="afterEffect">
+                                  <p:stCondLst>
                                     <p:cond delay="750"/>
                                   </p:stCondLst>
                                   <p:childTnLst>
                                     <p:set>
                                       <p:cBhvr>
-                                        <p:cTn id="6" dur="1" fill="hold">
+                                        <p:cTn id="9" dur="1" fill="hold">
                                           <p:stCondLst>
                                             <p:cond delay="0"/>
                                           </p:stCondLst>
@@ -29621,20 +30039,20 @@
                           </p:cTn>
                         </p:par>
                         <p:par>
-                          <p:cTn id="7" fill="hold">
+                          <p:cTn id="10" fill="hold">
                             <p:stCondLst>
                               <p:cond delay="750"/>
                             </p:stCondLst>
                             <p:childTnLst>
                               <p:par>
-                                <p:cTn id="8" presetID="1" presetClass="entr" presetSubtype="0" fill="hold" nodeType="afterEffect">
+                                <p:cTn id="11" presetID="1" presetClass="entr" presetSubtype="0" fill="hold" nodeType="afterEffect">
                                   <p:stCondLst>
                                     <p:cond delay="750"/>
                                   </p:stCondLst>
                                   <p:childTnLst>
                                     <p:set>
                                       <p:cBhvr>
-                                        <p:cTn id="9" dur="1" fill="hold">
+                                        <p:cTn id="12" dur="1" fill="hold">
                                           <p:stCondLst>
                                             <p:cond delay="0"/>
                                           </p:stCondLst>
@@ -29657,20 +30075,20 @@
                           </p:cTn>
                         </p:par>
                         <p:par>
-                          <p:cTn id="10" fill="hold">
+                          <p:cTn id="13" fill="hold">
                             <p:stCondLst>
                               <p:cond delay="1500"/>
                             </p:stCondLst>
                             <p:childTnLst>
                               <p:par>
-                                <p:cTn id="11" presetID="1" presetClass="entr" presetSubtype="0" fill="hold" nodeType="afterEffect">
+                                <p:cTn id="14" presetID="1" presetClass="entr" presetSubtype="0" fill="hold" nodeType="afterEffect">
                                   <p:stCondLst>
                                     <p:cond delay="750"/>
                                   </p:stCondLst>
                                   <p:childTnLst>
                                     <p:set>
                                       <p:cBhvr>
-                                        <p:cTn id="12" dur="1" fill="hold">
+                                        <p:cTn id="15" dur="1" fill="hold">
                                           <p:stCondLst>
                                             <p:cond delay="0"/>
                                           </p:stCondLst>
@@ -29693,20 +30111,20 @@
                           </p:cTn>
                         </p:par>
                         <p:par>
-                          <p:cTn id="13" fill="hold">
+                          <p:cTn id="16" fill="hold">
                             <p:stCondLst>
                               <p:cond delay="2250"/>
                             </p:stCondLst>
                             <p:childTnLst>
                               <p:par>
-                                <p:cTn id="14" presetID="1" presetClass="entr" presetSubtype="0" fill="hold" nodeType="afterEffect">
+                                <p:cTn id="17" presetID="1" presetClass="entr" presetSubtype="0" fill="hold" nodeType="afterEffect">
                                   <p:stCondLst>
                                     <p:cond delay="750"/>
                                   </p:stCondLst>
                                   <p:childTnLst>
                                     <p:set>
                                       <p:cBhvr>
-                                        <p:cTn id="15" dur="1" fill="hold">
+                                        <p:cTn id="18" dur="1" fill="hold">
                                           <p:stCondLst>
                                             <p:cond delay="0"/>
                                           </p:stCondLst>
@@ -29729,20 +30147,20 @@
                           </p:cTn>
                         </p:par>
                         <p:par>
-                          <p:cTn id="16" fill="hold">
+                          <p:cTn id="19" fill="hold">
                             <p:stCondLst>
                               <p:cond delay="3000"/>
                             </p:stCondLst>
                             <p:childTnLst>
                               <p:par>
-                                <p:cTn id="17" presetID="1" presetClass="entr" presetSubtype="0" fill="hold" nodeType="afterEffect">
+                                <p:cTn id="20" presetID="1" presetClass="entr" presetSubtype="0" fill="hold" nodeType="afterEffect">
                                   <p:stCondLst>
                                     <p:cond delay="750"/>
                                   </p:stCondLst>
                                   <p:childTnLst>
                                     <p:set>
                                       <p:cBhvr>
-                                        <p:cTn id="18" dur="1" fill="hold">
+                                        <p:cTn id="21" dur="1" fill="hold">
                                           <p:stCondLst>
                                             <p:cond delay="0"/>
                                           </p:stCondLst>
@@ -29765,20 +30183,20 @@
                           </p:cTn>
                         </p:par>
                         <p:par>
-                          <p:cTn id="19" fill="hold">
+                          <p:cTn id="22" fill="hold">
                             <p:stCondLst>
                               <p:cond delay="3750"/>
                             </p:stCondLst>
                             <p:childTnLst>
                               <p:par>
-                                <p:cTn id="20" presetID="1" presetClass="entr" presetSubtype="0" fill="hold" nodeType="afterEffect">
+                                <p:cTn id="23" presetID="1" presetClass="entr" presetSubtype="0" fill="hold" nodeType="afterEffect">
                                   <p:stCondLst>
                                     <p:cond delay="750"/>
                                   </p:stCondLst>
                                   <p:childTnLst>
                                     <p:set>
                                       <p:cBhvr>
-                                        <p:cTn id="21" dur="1" fill="hold">
+                                        <p:cTn id="24" dur="1" fill="hold">
                                           <p:stCondLst>
                                             <p:cond delay="0"/>
                                           </p:stCondLst>
@@ -29801,45 +30219,9 @@
                           </p:cTn>
                         </p:par>
                         <p:par>
-                          <p:cTn id="22" fill="hold">
+                          <p:cTn id="25" fill="hold">
                             <p:stCondLst>
                               <p:cond delay="4500"/>
-                            </p:stCondLst>
-                            <p:childTnLst>
-                              <p:par>
-                                <p:cTn id="23" presetID="1" presetClass="entr" presetSubtype="0" fill="hold" nodeType="afterEffect">
-                                  <p:stCondLst>
-                                    <p:cond delay="750"/>
-                                  </p:stCondLst>
-                                  <p:childTnLst>
-                                    <p:set>
-                                      <p:cBhvr>
-                                        <p:cTn id="24" dur="1" fill="hold">
-                                          <p:stCondLst>
-                                            <p:cond delay="0"/>
-                                          </p:stCondLst>
-                                        </p:cTn>
-                                        <p:tgtEl>
-                                          <p:spTgt spid="7"/>
-                                        </p:tgtEl>
-                                        <p:attrNameLst>
-                                          <p:attrName>style.visibility</p:attrName>
-                                        </p:attrNameLst>
-                                      </p:cBhvr>
-                                      <p:to>
-                                        <p:strVal val="visible"/>
-                                      </p:to>
-                                    </p:set>
-                                  </p:childTnLst>
-                                </p:cTn>
-                              </p:par>
-                            </p:childTnLst>
-                          </p:cTn>
-                        </p:par>
-                        <p:par>
-                          <p:cTn id="25" fill="hold">
-                            <p:stCondLst>
-                              <p:cond delay="5250"/>
                             </p:stCondLst>
                             <p:childTnLst>
                               <p:par>
@@ -29875,7 +30257,7 @@
                         <p:par>
                           <p:cTn id="28" fill="hold">
                             <p:stCondLst>
-                              <p:cond delay="6000"/>
+                              <p:cond delay="5250"/>
                             </p:stCondLst>
                             <p:childTnLst>
                               <p:par>
@@ -29893,6 +30275,42 @@
                                         </p:cTn>
                                         <p:tgtEl>
                                           <p:spTgt spid="8"/>
+                                        </p:tgtEl>
+                                        <p:attrNameLst>
+                                          <p:attrName>style.visibility</p:attrName>
+                                        </p:attrNameLst>
+                                      </p:cBhvr>
+                                      <p:to>
+                                        <p:strVal val="visible"/>
+                                      </p:to>
+                                    </p:set>
+                                  </p:childTnLst>
+                                </p:cTn>
+                              </p:par>
+                            </p:childTnLst>
+                          </p:cTn>
+                        </p:par>
+                        <p:par>
+                          <p:cTn id="31" fill="hold">
+                            <p:stCondLst>
+                              <p:cond delay="6000"/>
+                            </p:stCondLst>
+                            <p:childTnLst>
+                              <p:par>
+                                <p:cTn id="32" presetID="1" presetClass="entr" presetSubtype="0" fill="hold" nodeType="afterEffect">
+                                  <p:stCondLst>
+                                    <p:cond delay="750"/>
+                                  </p:stCondLst>
+                                  <p:childTnLst>
+                                    <p:set>
+                                      <p:cBhvr>
+                                        <p:cTn id="33" dur="1" fill="hold">
+                                          <p:stCondLst>
+                                            <p:cond delay="0"/>
+                                          </p:stCondLst>
+                                        </p:cTn>
+                                        <p:tgtEl>
+                                          <p:spTgt spid="7"/>
                                         </p:tgtEl>
                                         <p:attrNameLst>
                                           <p:attrName>style.visibility</p:attrName>
@@ -30821,7 +31239,7 @@
                             </p:stCondLst>
                             <p:childTnLst>
                               <p:par>
-                                <p:cTn id="26" presetID="2" presetClass="entr" presetSubtype="8" fill="hold" nodeType="afterEffect">
+                                <p:cTn id="26" presetID="2" presetClass="entr" presetSubtype="1" fill="hold" nodeType="afterEffect">
                                   <p:stCondLst>
                                     <p:cond delay="1000"/>
                                   </p:stCondLst>
@@ -30857,7 +31275,7 @@
                                       <p:tavLst>
                                         <p:tav tm="0">
                                           <p:val>
-                                            <p:strVal val="0-#ppt_w/2"/>
+                                            <p:strVal val="#ppt_x"/>
                                           </p:val>
                                         </p:tav>
                                         <p:tav tm="100000">
@@ -30880,7 +31298,7 @@
                                       <p:tavLst>
                                         <p:tav tm="0">
                                           <p:val>
-                                            <p:strVal val="#ppt_y"/>
+                                            <p:strVal val="0-#ppt_h/2"/>
                                           </p:val>
                                         </p:tav>
                                         <p:tav tm="100000">
@@ -31126,7 +31544,7 @@
         </p:blipFill>
         <p:spPr>
           <a:xfrm>
-            <a:off x="-1198095" y="1485900"/>
+            <a:off x="-1198095" y="2887980"/>
             <a:ext cx="914400" cy="914400"/>
           </a:xfrm>
           <a:prstGeom prst="rect">
@@ -31162,7 +31580,7 @@
         </p:blipFill>
         <p:spPr>
           <a:xfrm>
-            <a:off x="-1198095" y="2971800"/>
+            <a:off x="-1198095" y="3947160"/>
             <a:ext cx="914400" cy="914400"/>
           </a:xfrm>
           <a:prstGeom prst="rect">
@@ -31234,7 +31652,7 @@
         </p:blipFill>
         <p:spPr>
           <a:xfrm>
-            <a:off x="-1198095" y="4457700"/>
+            <a:off x="-1198095" y="4945380"/>
             <a:ext cx="914400" cy="914400"/>
           </a:xfrm>
           <a:prstGeom prst="rect">
@@ -31270,7 +31688,7 @@
         </p:blipFill>
         <p:spPr>
           <a:xfrm>
-            <a:off x="-1198095" y="0"/>
+            <a:off x="-1198095" y="1676400"/>
             <a:ext cx="914400" cy="914400"/>
           </a:xfrm>
           <a:prstGeom prst="rect">
@@ -31292,7 +31710,7 @@
         </p:nvSpPr>
         <p:spPr>
           <a:xfrm rot="16200000">
-            <a:off x="-170070" y="-884069"/>
+            <a:off x="-972960" y="943147"/>
             <a:ext cx="464127" cy="644236"/>
           </a:xfrm>
           <a:prstGeom prst="upArrow">

</xml_diff>